<commit_message>
No real change to info, just formatting
</commit_message>
<xml_diff>
--- a/Presentations/Supervisor Meetings/2024/20240426.pptx
+++ b/Presentations/Supervisor Meetings/2024/20240426.pptx
@@ -126,6 +126,7 @@
 <p1510:revInfo xmlns:a="http://schemas.openxmlformats.org/drawingml/2006/main" xmlns:r="http://schemas.openxmlformats.org/officeDocument/2006/relationships" xmlns:p1510="http://schemas.microsoft.com/office/powerpoint/2015/10/main">
   <p1510:revLst>
     <p1510:client id="{9455A729-DEA8-0906-87AC-952619AA4AD8}" v="8" dt="2024-04-26T08:17:40.189"/>
+    <p1510:client id="{C2FEBF0B-8B24-44C6-90A3-DAC88848FC33}" v="20" dt="2024-04-26T16:53:49.056"/>
     <p1510:client id="{E12EC61F-8702-47AE-A70E-9E0D5B45EE53}" v="14" dt="2024-04-26T09:10:09.697"/>
   </p1510:revLst>
 </p1510:revInfo>
@@ -135,17 +136,196 @@
 <pc:chgInfo xmlns:a="http://schemas.openxmlformats.org/drawingml/2006/main" xmlns:r="http://schemas.openxmlformats.org/officeDocument/2006/relationships" xmlns:ac="http://schemas.microsoft.com/office/drawing/2013/main/command" xmlns:pc="http://schemas.microsoft.com/office/powerpoint/2013/main/command">
   <pc:docChgLst>
     <pc:chgData name="Sean O Fithcheallaigh" userId="47659c31-a575-4792-8be3-61268c4ee0d6" providerId="ADAL" clId="{C2FEBF0B-8B24-44C6-90A3-DAC88848FC33}"/>
-    <pc:docChg chg="modSld">
-      <pc:chgData name="Sean O Fithcheallaigh" userId="47659c31-a575-4792-8be3-61268c4ee0d6" providerId="ADAL" clId="{C2FEBF0B-8B24-44C6-90A3-DAC88848FC33}" dt="2024-04-26T12:40:14.006" v="560" actId="20577"/>
+    <pc:docChg chg="undo custSel addSld delSld modSld modMainMaster">
+      <pc:chgData name="Sean O Fithcheallaigh" userId="47659c31-a575-4792-8be3-61268c4ee0d6" providerId="ADAL" clId="{C2FEBF0B-8B24-44C6-90A3-DAC88848FC33}" dt="2024-04-26T16:53:54.231" v="1244" actId="478"/>
       <pc:docMkLst>
         <pc:docMk/>
       </pc:docMkLst>
+      <pc:sldChg chg="modSp">
+        <pc:chgData name="Sean O Fithcheallaigh" userId="47659c31-a575-4792-8be3-61268c4ee0d6" providerId="ADAL" clId="{C2FEBF0B-8B24-44C6-90A3-DAC88848FC33}" dt="2024-04-26T16:29:58.859" v="974"/>
+        <pc:sldMkLst>
+          <pc:docMk/>
+          <pc:sldMk cId="3126834720" sldId="257"/>
+        </pc:sldMkLst>
+        <pc:spChg chg="mod">
+          <ac:chgData name="Sean O Fithcheallaigh" userId="47659c31-a575-4792-8be3-61268c4ee0d6" providerId="ADAL" clId="{C2FEBF0B-8B24-44C6-90A3-DAC88848FC33}" dt="2024-04-26T16:29:58.859" v="974"/>
+          <ac:spMkLst>
+            <pc:docMk/>
+            <pc:sldMk cId="3126834720" sldId="257"/>
+            <ac:spMk id="5" creationId="{23AEC3DF-CD72-34CD-956B-B7BB00135A83}"/>
+          </ac:spMkLst>
+        </pc:spChg>
+      </pc:sldChg>
+      <pc:sldChg chg="modSp">
+        <pc:chgData name="Sean O Fithcheallaigh" userId="47659c31-a575-4792-8be3-61268c4ee0d6" providerId="ADAL" clId="{C2FEBF0B-8B24-44C6-90A3-DAC88848FC33}" dt="2024-04-26T16:29:58.859" v="974"/>
+        <pc:sldMkLst>
+          <pc:docMk/>
+          <pc:sldMk cId="2974212779" sldId="262"/>
+        </pc:sldMkLst>
+        <pc:spChg chg="mod">
+          <ac:chgData name="Sean O Fithcheallaigh" userId="47659c31-a575-4792-8be3-61268c4ee0d6" providerId="ADAL" clId="{C2FEBF0B-8B24-44C6-90A3-DAC88848FC33}" dt="2024-04-26T16:29:58.859" v="974"/>
+          <ac:spMkLst>
+            <pc:docMk/>
+            <pc:sldMk cId="2974212779" sldId="262"/>
+            <ac:spMk id="25" creationId="{5D555122-A67E-973E-7070-74B19E51C0CA}"/>
+          </ac:spMkLst>
+        </pc:spChg>
+      </pc:sldChg>
+      <pc:sldChg chg="addSp delSp modSp mod">
+        <pc:chgData name="Sean O Fithcheallaigh" userId="47659c31-a575-4792-8be3-61268c4ee0d6" providerId="ADAL" clId="{C2FEBF0B-8B24-44C6-90A3-DAC88848FC33}" dt="2024-04-26T12:51:00.393" v="577" actId="113"/>
+        <pc:sldMkLst>
+          <pc:docMk/>
+          <pc:sldMk cId="4284502419" sldId="265"/>
+        </pc:sldMkLst>
+        <pc:spChg chg="mod">
+          <ac:chgData name="Sean O Fithcheallaigh" userId="47659c31-a575-4792-8be3-61268c4ee0d6" providerId="ADAL" clId="{C2FEBF0B-8B24-44C6-90A3-DAC88848FC33}" dt="2024-04-26T12:50:39.792" v="574" actId="14100"/>
+          <ac:spMkLst>
+            <pc:docMk/>
+            <pc:sldMk cId="4284502419" sldId="265"/>
+            <ac:spMk id="3" creationId="{EE175A63-36B0-CECB-0B07-44D6AAC9086E}"/>
+          </ac:spMkLst>
+        </pc:spChg>
+        <pc:spChg chg="mod">
+          <ac:chgData name="Sean O Fithcheallaigh" userId="47659c31-a575-4792-8be3-61268c4ee0d6" providerId="ADAL" clId="{C2FEBF0B-8B24-44C6-90A3-DAC88848FC33}" dt="2024-04-26T12:51:00.393" v="577" actId="113"/>
+          <ac:spMkLst>
+            <pc:docMk/>
+            <pc:sldMk cId="4284502419" sldId="265"/>
+            <ac:spMk id="6" creationId="{D8917F05-ED17-A033-DF53-9F7D8E84B7A6}"/>
+          </ac:spMkLst>
+        </pc:spChg>
+        <pc:spChg chg="add del mod">
+          <ac:chgData name="Sean O Fithcheallaigh" userId="47659c31-a575-4792-8be3-61268c4ee0d6" providerId="ADAL" clId="{C2FEBF0B-8B24-44C6-90A3-DAC88848FC33}" dt="2024-04-26T12:50:03.750" v="563" actId="478"/>
+          <ac:spMkLst>
+            <pc:docMk/>
+            <pc:sldMk cId="4284502419" sldId="265"/>
+            <ac:spMk id="7" creationId="{05BF32DC-FBFB-1CC2-0FBF-9E1215168554}"/>
+          </ac:spMkLst>
+        </pc:spChg>
+        <pc:spChg chg="del">
+          <ac:chgData name="Sean O Fithcheallaigh" userId="47659c31-a575-4792-8be3-61268c4ee0d6" providerId="ADAL" clId="{C2FEBF0B-8B24-44C6-90A3-DAC88848FC33}" dt="2024-04-26T12:50:01.098" v="562" actId="478"/>
+          <ac:spMkLst>
+            <pc:docMk/>
+            <pc:sldMk cId="4284502419" sldId="265"/>
+            <ac:spMk id="17" creationId="{C31A4E13-5F28-94ED-4FD6-DC5893FB7BD9}"/>
+          </ac:spMkLst>
+        </pc:spChg>
+        <pc:picChg chg="mod">
+          <ac:chgData name="Sean O Fithcheallaigh" userId="47659c31-a575-4792-8be3-61268c4ee0d6" providerId="ADAL" clId="{C2FEBF0B-8B24-44C6-90A3-DAC88848FC33}" dt="2024-04-26T12:50:33.706" v="573" actId="1076"/>
+          <ac:picMkLst>
+            <pc:docMk/>
+            <pc:sldMk cId="4284502419" sldId="265"/>
+            <ac:picMk id="9" creationId="{0F76970F-815E-3AB8-F51F-F5B457452DB9}"/>
+          </ac:picMkLst>
+        </pc:picChg>
+        <pc:picChg chg="add mod">
+          <ac:chgData name="Sean O Fithcheallaigh" userId="47659c31-a575-4792-8be3-61268c4ee0d6" providerId="ADAL" clId="{C2FEBF0B-8B24-44C6-90A3-DAC88848FC33}" dt="2024-04-26T12:50:17.318" v="568" actId="1076"/>
+          <ac:picMkLst>
+            <pc:docMk/>
+            <pc:sldMk cId="4284502419" sldId="265"/>
+            <ac:picMk id="10" creationId="{98AF2C53-745E-2EFD-CD0C-23788E4785BE}"/>
+          </ac:picMkLst>
+        </pc:picChg>
+        <pc:picChg chg="mod">
+          <ac:chgData name="Sean O Fithcheallaigh" userId="47659c31-a575-4792-8be3-61268c4ee0d6" providerId="ADAL" clId="{C2FEBF0B-8B24-44C6-90A3-DAC88848FC33}" dt="2024-04-26T12:50:24.638" v="570" actId="1076"/>
+          <ac:picMkLst>
+            <pc:docMk/>
+            <pc:sldMk cId="4284502419" sldId="265"/>
+            <ac:picMk id="12" creationId="{C0BCE2C8-81EE-353A-E63E-6D59FE09006A}"/>
+          </ac:picMkLst>
+        </pc:picChg>
+        <pc:picChg chg="del">
+          <ac:chgData name="Sean O Fithcheallaigh" userId="47659c31-a575-4792-8be3-61268c4ee0d6" providerId="ADAL" clId="{C2FEBF0B-8B24-44C6-90A3-DAC88848FC33}" dt="2024-04-26T12:49:57.578" v="561" actId="478"/>
+          <ac:picMkLst>
+            <pc:docMk/>
+            <pc:sldMk cId="4284502419" sldId="265"/>
+            <ac:picMk id="14" creationId="{0D671002-A1C1-5991-19D7-14273487CF59}"/>
+          </ac:picMkLst>
+        </pc:picChg>
+        <pc:picChg chg="del">
+          <ac:chgData name="Sean O Fithcheallaigh" userId="47659c31-a575-4792-8be3-61268c4ee0d6" providerId="ADAL" clId="{C2FEBF0B-8B24-44C6-90A3-DAC88848FC33}" dt="2024-04-26T12:50:05.544" v="564" actId="478"/>
+          <ac:picMkLst>
+            <pc:docMk/>
+            <pc:sldMk cId="4284502419" sldId="265"/>
+            <ac:picMk id="16" creationId="{9DF56113-8FB4-E099-8726-3F16F626D2FE}"/>
+          </ac:picMkLst>
+        </pc:picChg>
+      </pc:sldChg>
+      <pc:sldChg chg="modSp">
+        <pc:chgData name="Sean O Fithcheallaigh" userId="47659c31-a575-4792-8be3-61268c4ee0d6" providerId="ADAL" clId="{C2FEBF0B-8B24-44C6-90A3-DAC88848FC33}" dt="2024-04-26T16:29:58.859" v="974"/>
+        <pc:sldMkLst>
+          <pc:docMk/>
+          <pc:sldMk cId="129023176" sldId="266"/>
+        </pc:sldMkLst>
+        <pc:spChg chg="mod">
+          <ac:chgData name="Sean O Fithcheallaigh" userId="47659c31-a575-4792-8be3-61268c4ee0d6" providerId="ADAL" clId="{C2FEBF0B-8B24-44C6-90A3-DAC88848FC33}" dt="2024-04-26T16:29:58.859" v="974"/>
+          <ac:spMkLst>
+            <pc:docMk/>
+            <pc:sldMk cId="129023176" sldId="266"/>
+            <ac:spMk id="25" creationId="{5D555122-A67E-973E-7070-74B19E51C0CA}"/>
+          </ac:spMkLst>
+        </pc:spChg>
+      </pc:sldChg>
       <pc:sldChg chg="modSp mod">
-        <pc:chgData name="Sean O Fithcheallaigh" userId="47659c31-a575-4792-8be3-61268c4ee0d6" providerId="ADAL" clId="{C2FEBF0B-8B24-44C6-90A3-DAC88848FC33}" dt="2024-04-26T12:40:14.006" v="560" actId="20577"/>
+        <pc:chgData name="Sean O Fithcheallaigh" userId="47659c31-a575-4792-8be3-61268c4ee0d6" providerId="ADAL" clId="{C2FEBF0B-8B24-44C6-90A3-DAC88848FC33}" dt="2024-04-26T16:30:00.652" v="976"/>
+        <pc:sldMkLst>
+          <pc:docMk/>
+          <pc:sldMk cId="3614502453" sldId="267"/>
+        </pc:sldMkLst>
+        <pc:spChg chg="mod">
+          <ac:chgData name="Sean O Fithcheallaigh" userId="47659c31-a575-4792-8be3-61268c4ee0d6" providerId="ADAL" clId="{C2FEBF0B-8B24-44C6-90A3-DAC88848FC33}" dt="2024-04-26T16:30:00.652" v="976"/>
+          <ac:spMkLst>
+            <pc:docMk/>
+            <pc:sldMk cId="3614502453" sldId="267"/>
+            <ac:spMk id="2" creationId="{34D60807-593D-B6E4-7AE4-7CF45EBBFEDA}"/>
+          </ac:spMkLst>
+        </pc:spChg>
+        <pc:spChg chg="mod">
+          <ac:chgData name="Sean O Fithcheallaigh" userId="47659c31-a575-4792-8be3-61268c4ee0d6" providerId="ADAL" clId="{C2FEBF0B-8B24-44C6-90A3-DAC88848FC33}" dt="2024-04-26T12:54:36.500" v="707" actId="20577"/>
+          <ac:spMkLst>
+            <pc:docMk/>
+            <pc:sldMk cId="3614502453" sldId="267"/>
+            <ac:spMk id="3" creationId="{13A96DD8-307D-473C-C18D-20E27E856752}"/>
+          </ac:spMkLst>
+        </pc:spChg>
+        <pc:spChg chg="mod">
+          <ac:chgData name="Sean O Fithcheallaigh" userId="47659c31-a575-4792-8be3-61268c4ee0d6" providerId="ADAL" clId="{C2FEBF0B-8B24-44C6-90A3-DAC88848FC33}" dt="2024-04-26T16:29:58.859" v="974"/>
+          <ac:spMkLst>
+            <pc:docMk/>
+            <pc:sldMk cId="3614502453" sldId="267"/>
+            <ac:spMk id="4" creationId="{74C17E6D-2CC1-4BC8-7340-A59AA673324F}"/>
+          </ac:spMkLst>
+        </pc:spChg>
+      </pc:sldChg>
+      <pc:sldChg chg="addSp delSp modSp mod">
+        <pc:chgData name="Sean O Fithcheallaigh" userId="47659c31-a575-4792-8be3-61268c4ee0d6" providerId="ADAL" clId="{C2FEBF0B-8B24-44C6-90A3-DAC88848FC33}" dt="2024-04-26T16:53:54.231" v="1244" actId="478"/>
         <pc:sldMkLst>
           <pc:docMk/>
           <pc:sldMk cId="1936036229" sldId="268"/>
         </pc:sldMkLst>
+        <pc:spChg chg="add del mod">
+          <ac:chgData name="Sean O Fithcheallaigh" userId="47659c31-a575-4792-8be3-61268c4ee0d6" providerId="ADAL" clId="{C2FEBF0B-8B24-44C6-90A3-DAC88848FC33}" dt="2024-04-26T16:53:54.231" v="1244" actId="478"/>
+          <ac:spMkLst>
+            <pc:docMk/>
+            <pc:sldMk cId="1936036229" sldId="268"/>
+            <ac:spMk id="4" creationId="{DDF68F1E-D150-FEFC-A6A6-19E1010F4203}"/>
+          </ac:spMkLst>
+        </pc:spChg>
+        <pc:spChg chg="mod">
+          <ac:chgData name="Sean O Fithcheallaigh" userId="47659c31-a575-4792-8be3-61268c4ee0d6" providerId="ADAL" clId="{C2FEBF0B-8B24-44C6-90A3-DAC88848FC33}" dt="2024-04-26T16:29:58.859" v="974"/>
+          <ac:spMkLst>
+            <pc:docMk/>
+            <pc:sldMk cId="1936036229" sldId="268"/>
+            <ac:spMk id="5" creationId="{5FD5D998-F248-0400-3B80-6F096751E473}"/>
+          </ac:spMkLst>
+        </pc:spChg>
+        <pc:spChg chg="mod">
+          <ac:chgData name="Sean O Fithcheallaigh" userId="47659c31-a575-4792-8be3-61268c4ee0d6" providerId="ADAL" clId="{C2FEBF0B-8B24-44C6-90A3-DAC88848FC33}" dt="2024-04-26T16:30:00.652" v="976"/>
+          <ac:spMkLst>
+            <pc:docMk/>
+            <pc:sldMk cId="1936036229" sldId="268"/>
+            <ac:spMk id="6" creationId="{3C603FAD-A61A-E6D1-622F-51F35D0A65A3}"/>
+          </ac:spMkLst>
+        </pc:spChg>
         <pc:spChg chg="mod">
           <ac:chgData name="Sean O Fithcheallaigh" userId="47659c31-a575-4792-8be3-61268c4ee0d6" providerId="ADAL" clId="{C2FEBF0B-8B24-44C6-90A3-DAC88848FC33}" dt="2024-04-26T12:40:14.006" v="560" actId="20577"/>
           <ac:spMkLst>
@@ -155,6 +335,417 @@
           </ac:spMkLst>
         </pc:spChg>
       </pc:sldChg>
+      <pc:sldChg chg="modSp mod">
+        <pc:chgData name="Sean O Fithcheallaigh" userId="47659c31-a575-4792-8be3-61268c4ee0d6" providerId="ADAL" clId="{C2FEBF0B-8B24-44C6-90A3-DAC88848FC33}" dt="2024-04-26T12:53:46.318" v="692" actId="20577"/>
+        <pc:sldMkLst>
+          <pc:docMk/>
+          <pc:sldMk cId="3861696641" sldId="270"/>
+        </pc:sldMkLst>
+        <pc:spChg chg="mod">
+          <ac:chgData name="Sean O Fithcheallaigh" userId="47659c31-a575-4792-8be3-61268c4ee0d6" providerId="ADAL" clId="{C2FEBF0B-8B24-44C6-90A3-DAC88848FC33}" dt="2024-04-26T12:53:46.318" v="692" actId="20577"/>
+          <ac:spMkLst>
+            <pc:docMk/>
+            <pc:sldMk cId="3861696641" sldId="270"/>
+            <ac:spMk id="5" creationId="{8B74359D-39CC-589B-1643-20904CA4E64C}"/>
+          </ac:spMkLst>
+        </pc:spChg>
+        <pc:picChg chg="mod">
+          <ac:chgData name="Sean O Fithcheallaigh" userId="47659c31-a575-4792-8be3-61268c4ee0d6" providerId="ADAL" clId="{C2FEBF0B-8B24-44C6-90A3-DAC88848FC33}" dt="2024-04-26T12:52:30.294" v="623" actId="1076"/>
+          <ac:picMkLst>
+            <pc:docMk/>
+            <pc:sldMk cId="3861696641" sldId="270"/>
+            <ac:picMk id="11" creationId="{650141E5-3AC2-59E3-194F-77E4352C8591}"/>
+          </ac:picMkLst>
+        </pc:picChg>
+      </pc:sldChg>
+      <pc:sldChg chg="modSp new del mod">
+        <pc:chgData name="Sean O Fithcheallaigh" userId="47659c31-a575-4792-8be3-61268c4ee0d6" providerId="ADAL" clId="{C2FEBF0B-8B24-44C6-90A3-DAC88848FC33}" dt="2024-04-26T14:06:34.691" v="922" actId="2696"/>
+        <pc:sldMkLst>
+          <pc:docMk/>
+          <pc:sldMk cId="297208298" sldId="271"/>
+        </pc:sldMkLst>
+        <pc:spChg chg="mod">
+          <ac:chgData name="Sean O Fithcheallaigh" userId="47659c31-a575-4792-8be3-61268c4ee0d6" providerId="ADAL" clId="{C2FEBF0B-8B24-44C6-90A3-DAC88848FC33}" dt="2024-04-26T13:54:45.620" v="714" actId="20577"/>
+          <ac:spMkLst>
+            <pc:docMk/>
+            <pc:sldMk cId="297208298" sldId="271"/>
+            <ac:spMk id="2" creationId="{073740F3-1B0D-2928-8040-9936725E1DCA}"/>
+          </ac:spMkLst>
+        </pc:spChg>
+        <pc:spChg chg="mod">
+          <ac:chgData name="Sean O Fithcheallaigh" userId="47659c31-a575-4792-8be3-61268c4ee0d6" providerId="ADAL" clId="{C2FEBF0B-8B24-44C6-90A3-DAC88848FC33}" dt="2024-04-26T13:55:45.577" v="921" actId="20577"/>
+          <ac:spMkLst>
+            <pc:docMk/>
+            <pc:sldMk cId="297208298" sldId="271"/>
+            <ac:spMk id="3" creationId="{EC098857-9347-1975-CE0E-C4F6428755FF}"/>
+          </ac:spMkLst>
+        </pc:spChg>
+      </pc:sldChg>
+      <pc:sldMasterChg chg="modSldLayout">
+        <pc:chgData name="Sean O Fithcheallaigh" userId="47659c31-a575-4792-8be3-61268c4ee0d6" providerId="ADAL" clId="{C2FEBF0B-8B24-44C6-90A3-DAC88848FC33}" dt="2024-04-26T16:39:23.958" v="1241" actId="20577"/>
+        <pc:sldMasterMkLst>
+          <pc:docMk/>
+          <pc:sldMasterMk cId="2989193502" sldId="2147483884"/>
+        </pc:sldMasterMkLst>
+        <pc:sldLayoutChg chg="addSp delSp modSp mod">
+          <pc:chgData name="Sean O Fithcheallaigh" userId="47659c31-a575-4792-8be3-61268c4ee0d6" providerId="ADAL" clId="{C2FEBF0B-8B24-44C6-90A3-DAC88848FC33}" dt="2024-04-26T16:30:57.654" v="1000" actId="478"/>
+          <pc:sldLayoutMkLst>
+            <pc:docMk/>
+            <pc:sldMasterMk cId="2989193502" sldId="2147483884"/>
+            <pc:sldLayoutMk cId="1032340772" sldId="2147483885"/>
+          </pc:sldLayoutMkLst>
+          <pc:spChg chg="mod">
+            <ac:chgData name="Sean O Fithcheallaigh" userId="47659c31-a575-4792-8be3-61268c4ee0d6" providerId="ADAL" clId="{C2FEBF0B-8B24-44C6-90A3-DAC88848FC33}" dt="2024-04-26T16:26:08.579" v="937" actId="20577"/>
+            <ac:spMkLst>
+              <pc:docMk/>
+              <pc:sldMasterMk cId="2989193502" sldId="2147483884"/>
+              <pc:sldLayoutMk cId="1032340772" sldId="2147483885"/>
+              <ac:spMk id="6" creationId="{00000000-0000-0000-0000-000000000000}"/>
+            </ac:spMkLst>
+          </pc:spChg>
+          <pc:spChg chg="mod">
+            <ac:chgData name="Sean O Fithcheallaigh" userId="47659c31-a575-4792-8be3-61268c4ee0d6" providerId="ADAL" clId="{C2FEBF0B-8B24-44C6-90A3-DAC88848FC33}" dt="2024-04-26T16:24:44.327" v="929" actId="20577"/>
+            <ac:spMkLst>
+              <pc:docMk/>
+              <pc:sldMasterMk cId="2989193502" sldId="2147483884"/>
+              <pc:sldLayoutMk cId="1032340772" sldId="2147483885"/>
+              <ac:spMk id="7" creationId="{00000000-0000-0000-0000-000000000000}"/>
+            </ac:spMkLst>
+          </pc:spChg>
+          <pc:spChg chg="add del mod">
+            <ac:chgData name="Sean O Fithcheallaigh" userId="47659c31-a575-4792-8be3-61268c4ee0d6" providerId="ADAL" clId="{C2FEBF0B-8B24-44C6-90A3-DAC88848FC33}" dt="2024-04-26T16:30:57.654" v="1000" actId="478"/>
+            <ac:spMkLst>
+              <pc:docMk/>
+              <pc:sldMasterMk cId="2989193502" sldId="2147483884"/>
+              <pc:sldLayoutMk cId="1032340772" sldId="2147483885"/>
+              <ac:spMk id="11" creationId="{E1C1C431-5999-553B-35FC-461AEE292FEE}"/>
+            </ac:spMkLst>
+          </pc:spChg>
+        </pc:sldLayoutChg>
+        <pc:sldLayoutChg chg="addSp delSp modSp mod">
+          <pc:chgData name="Sean O Fithcheallaigh" userId="47659c31-a575-4792-8be3-61268c4ee0d6" providerId="ADAL" clId="{C2FEBF0B-8B24-44C6-90A3-DAC88848FC33}" dt="2024-04-26T16:38:23.550" v="1185" actId="478"/>
+          <pc:sldLayoutMkLst>
+            <pc:docMk/>
+            <pc:sldMasterMk cId="2989193502" sldId="2147483884"/>
+            <pc:sldLayoutMk cId="2634379243" sldId="2147483886"/>
+          </pc:sldLayoutMkLst>
+          <pc:spChg chg="del">
+            <ac:chgData name="Sean O Fithcheallaigh" userId="47659c31-a575-4792-8be3-61268c4ee0d6" providerId="ADAL" clId="{C2FEBF0B-8B24-44C6-90A3-DAC88848FC33}" dt="2024-04-26T16:30:00.652" v="976"/>
+            <ac:spMkLst>
+              <pc:docMk/>
+              <pc:sldMasterMk cId="2989193502" sldId="2147483884"/>
+              <pc:sldLayoutMk cId="2634379243" sldId="2147483886"/>
+              <ac:spMk id="2" creationId="{00000000-0000-0000-0000-000000000000}"/>
+            </ac:spMkLst>
+          </pc:spChg>
+          <pc:spChg chg="add mod">
+            <ac:chgData name="Sean O Fithcheallaigh" userId="47659c31-a575-4792-8be3-61268c4ee0d6" providerId="ADAL" clId="{C2FEBF0B-8B24-44C6-90A3-DAC88848FC33}" dt="2024-04-26T16:29:59.478" v="975"/>
+            <ac:spMkLst>
+              <pc:docMk/>
+              <pc:sldMasterMk cId="2989193502" sldId="2147483884"/>
+              <pc:sldLayoutMk cId="2634379243" sldId="2147483886"/>
+              <ac:spMk id="4" creationId="{32CA3BB0-ABD2-570B-583C-1071A2380DC3}"/>
+            </ac:spMkLst>
+          </pc:spChg>
+          <pc:spChg chg="add mod">
+            <ac:chgData name="Sean O Fithcheallaigh" userId="47659c31-a575-4792-8be3-61268c4ee0d6" providerId="ADAL" clId="{C2FEBF0B-8B24-44C6-90A3-DAC88848FC33}" dt="2024-04-26T16:29:59.478" v="975"/>
+            <ac:spMkLst>
+              <pc:docMk/>
+              <pc:sldMasterMk cId="2989193502" sldId="2147483884"/>
+              <pc:sldLayoutMk cId="2634379243" sldId="2147483886"/>
+              <ac:spMk id="5" creationId="{D82E76A2-E7F3-53D9-FE64-5134EEA0E34D}"/>
+            </ac:spMkLst>
+          </pc:spChg>
+          <pc:spChg chg="del">
+            <ac:chgData name="Sean O Fithcheallaigh" userId="47659c31-a575-4792-8be3-61268c4ee0d6" providerId="ADAL" clId="{C2FEBF0B-8B24-44C6-90A3-DAC88848FC33}" dt="2024-04-26T16:29:58.859" v="974"/>
+            <ac:spMkLst>
+              <pc:docMk/>
+              <pc:sldMasterMk cId="2989193502" sldId="2147483884"/>
+              <pc:sldLayoutMk cId="2634379243" sldId="2147483886"/>
+              <ac:spMk id="7" creationId="{4B72DB9C-5DEA-6DD4-784F-41BD58908A73}"/>
+            </ac:spMkLst>
+          </pc:spChg>
+          <pc:spChg chg="del">
+            <ac:chgData name="Sean O Fithcheallaigh" userId="47659c31-a575-4792-8be3-61268c4ee0d6" providerId="ADAL" clId="{C2FEBF0B-8B24-44C6-90A3-DAC88848FC33}" dt="2024-04-26T16:29:58.859" v="974"/>
+            <ac:spMkLst>
+              <pc:docMk/>
+              <pc:sldMasterMk cId="2989193502" sldId="2147483884"/>
+              <pc:sldLayoutMk cId="2634379243" sldId="2147483886"/>
+              <ac:spMk id="8" creationId="{A289F02A-CEE2-6F05-59EC-E6ABF87D1DC6}"/>
+            </ac:spMkLst>
+          </pc:spChg>
+          <pc:spChg chg="del mod">
+            <ac:chgData name="Sean O Fithcheallaigh" userId="47659c31-a575-4792-8be3-61268c4ee0d6" providerId="ADAL" clId="{C2FEBF0B-8B24-44C6-90A3-DAC88848FC33}" dt="2024-04-26T16:29:58.859" v="974"/>
+            <ac:spMkLst>
+              <pc:docMk/>
+              <pc:sldMasterMk cId="2989193502" sldId="2147483884"/>
+              <pc:sldLayoutMk cId="2634379243" sldId="2147483886"/>
+              <ac:spMk id="9" creationId="{AF8782C5-747C-DD09-7234-882A1D5FD405}"/>
+            </ac:spMkLst>
+          </pc:spChg>
+          <pc:spChg chg="add mod">
+            <ac:chgData name="Sean O Fithcheallaigh" userId="47659c31-a575-4792-8be3-61268c4ee0d6" providerId="ADAL" clId="{C2FEBF0B-8B24-44C6-90A3-DAC88848FC33}" dt="2024-04-26T16:37:30.283" v="1184" actId="20577"/>
+            <ac:spMkLst>
+              <pc:docMk/>
+              <pc:sldMasterMk cId="2989193502" sldId="2147483884"/>
+              <pc:sldLayoutMk cId="2634379243" sldId="2147483886"/>
+              <ac:spMk id="10" creationId="{2EE445F7-B179-E8DE-D480-8DF57793A679}"/>
+            </ac:spMkLst>
+          </pc:spChg>
+          <pc:spChg chg="add mod">
+            <ac:chgData name="Sean O Fithcheallaigh" userId="47659c31-a575-4792-8be3-61268c4ee0d6" providerId="ADAL" clId="{C2FEBF0B-8B24-44C6-90A3-DAC88848FC33}" dt="2024-04-26T16:30:01.328" v="977"/>
+            <ac:spMkLst>
+              <pc:docMk/>
+              <pc:sldMasterMk cId="2989193502" sldId="2147483884"/>
+              <pc:sldLayoutMk cId="2634379243" sldId="2147483886"/>
+              <ac:spMk id="11" creationId="{89FC3449-D20D-A55B-145B-B78CC5FFD454}"/>
+            </ac:spMkLst>
+          </pc:spChg>
+          <pc:spChg chg="add del mod">
+            <ac:chgData name="Sean O Fithcheallaigh" userId="47659c31-a575-4792-8be3-61268c4ee0d6" providerId="ADAL" clId="{C2FEBF0B-8B24-44C6-90A3-DAC88848FC33}" dt="2024-04-26T16:31:01.933" v="1001" actId="478"/>
+            <ac:spMkLst>
+              <pc:docMk/>
+              <pc:sldMasterMk cId="2989193502" sldId="2147483884"/>
+              <pc:sldLayoutMk cId="2634379243" sldId="2147483886"/>
+              <ac:spMk id="12" creationId="{75302D71-CDF7-7C5B-1E7C-8E731CC114F0}"/>
+            </ac:spMkLst>
+          </pc:spChg>
+          <pc:spChg chg="add del mod">
+            <ac:chgData name="Sean O Fithcheallaigh" userId="47659c31-a575-4792-8be3-61268c4ee0d6" providerId="ADAL" clId="{C2FEBF0B-8B24-44C6-90A3-DAC88848FC33}" dt="2024-04-26T16:38:23.550" v="1185" actId="478"/>
+            <ac:spMkLst>
+              <pc:docMk/>
+              <pc:sldMasterMk cId="2989193502" sldId="2147483884"/>
+              <pc:sldLayoutMk cId="2634379243" sldId="2147483886"/>
+              <ac:spMk id="13" creationId="{F4E14034-81E4-E9CC-7206-DF37701450A0}"/>
+            </ac:spMkLst>
+          </pc:spChg>
+          <pc:spChg chg="add del mod">
+            <ac:chgData name="Sean O Fithcheallaigh" userId="47659c31-a575-4792-8be3-61268c4ee0d6" providerId="ADAL" clId="{C2FEBF0B-8B24-44C6-90A3-DAC88848FC33}" dt="2024-04-26T16:38:23.550" v="1185" actId="478"/>
+            <ac:spMkLst>
+              <pc:docMk/>
+              <pc:sldMasterMk cId="2989193502" sldId="2147483884"/>
+              <pc:sldLayoutMk cId="2634379243" sldId="2147483886"/>
+              <ac:spMk id="14" creationId="{08D9455B-3D1A-FF0A-0130-C064DC60A6C4}"/>
+            </ac:spMkLst>
+          </pc:spChg>
+          <pc:spChg chg="add del mod">
+            <ac:chgData name="Sean O Fithcheallaigh" userId="47659c31-a575-4792-8be3-61268c4ee0d6" providerId="ADAL" clId="{C2FEBF0B-8B24-44C6-90A3-DAC88848FC33}" dt="2024-04-26T16:38:23.550" v="1185" actId="478"/>
+            <ac:spMkLst>
+              <pc:docMk/>
+              <pc:sldMasterMk cId="2989193502" sldId="2147483884"/>
+              <pc:sldLayoutMk cId="2634379243" sldId="2147483886"/>
+              <ac:spMk id="15" creationId="{F34FD339-F9BC-2F4E-DAE3-49C9437BB925}"/>
+            </ac:spMkLst>
+          </pc:spChg>
+          <pc:spChg chg="add del mod">
+            <ac:chgData name="Sean O Fithcheallaigh" userId="47659c31-a575-4792-8be3-61268c4ee0d6" providerId="ADAL" clId="{C2FEBF0B-8B24-44C6-90A3-DAC88848FC33}" dt="2024-04-26T16:38:23.550" v="1185" actId="478"/>
+            <ac:spMkLst>
+              <pc:docMk/>
+              <pc:sldMasterMk cId="2989193502" sldId="2147483884"/>
+              <pc:sldLayoutMk cId="2634379243" sldId="2147483886"/>
+              <ac:spMk id="16" creationId="{D223680F-4693-67FB-5A76-E3C55125FF21}"/>
+            </ac:spMkLst>
+          </pc:spChg>
+          <pc:spChg chg="add del mod">
+            <ac:chgData name="Sean O Fithcheallaigh" userId="47659c31-a575-4792-8be3-61268c4ee0d6" providerId="ADAL" clId="{C2FEBF0B-8B24-44C6-90A3-DAC88848FC33}" dt="2024-04-26T16:38:23.550" v="1185" actId="478"/>
+            <ac:spMkLst>
+              <pc:docMk/>
+              <pc:sldMasterMk cId="2989193502" sldId="2147483884"/>
+              <pc:sldLayoutMk cId="2634379243" sldId="2147483886"/>
+              <ac:spMk id="19" creationId="{C9E962DB-93DF-03F9-AF63-FD2DD1D93EDF}"/>
+            </ac:spMkLst>
+          </pc:spChg>
+          <pc:spChg chg="add del mod">
+            <ac:chgData name="Sean O Fithcheallaigh" userId="47659c31-a575-4792-8be3-61268c4ee0d6" providerId="ADAL" clId="{C2FEBF0B-8B24-44C6-90A3-DAC88848FC33}" dt="2024-04-26T16:38:23.550" v="1185" actId="478"/>
+            <ac:spMkLst>
+              <pc:docMk/>
+              <pc:sldMasterMk cId="2989193502" sldId="2147483884"/>
+              <pc:sldLayoutMk cId="2634379243" sldId="2147483886"/>
+              <ac:spMk id="20" creationId="{4A7B2C32-471B-79ED-335C-0DA1253BE85F}"/>
+            </ac:spMkLst>
+          </pc:spChg>
+          <pc:spChg chg="add del mod">
+            <ac:chgData name="Sean O Fithcheallaigh" userId="47659c31-a575-4792-8be3-61268c4ee0d6" providerId="ADAL" clId="{C2FEBF0B-8B24-44C6-90A3-DAC88848FC33}" dt="2024-04-26T16:38:23.550" v="1185" actId="478"/>
+            <ac:spMkLst>
+              <pc:docMk/>
+              <pc:sldMasterMk cId="2989193502" sldId="2147483884"/>
+              <pc:sldLayoutMk cId="2634379243" sldId="2147483886"/>
+              <ac:spMk id="21" creationId="{9D8A44A5-E606-5724-B4FE-1F1555A31805}"/>
+            </ac:spMkLst>
+          </pc:spChg>
+          <pc:spChg chg="add del mod">
+            <ac:chgData name="Sean O Fithcheallaigh" userId="47659c31-a575-4792-8be3-61268c4ee0d6" providerId="ADAL" clId="{C2FEBF0B-8B24-44C6-90A3-DAC88848FC33}" dt="2024-04-26T16:38:23.550" v="1185" actId="478"/>
+            <ac:spMkLst>
+              <pc:docMk/>
+              <pc:sldMasterMk cId="2989193502" sldId="2147483884"/>
+              <pc:sldLayoutMk cId="2634379243" sldId="2147483886"/>
+              <ac:spMk id="22" creationId="{EE49CA09-2203-71D0-BC31-268AC15C0D85}"/>
+            </ac:spMkLst>
+          </pc:spChg>
+          <pc:cxnChg chg="add del">
+            <ac:chgData name="Sean O Fithcheallaigh" userId="47659c31-a575-4792-8be3-61268c4ee0d6" providerId="ADAL" clId="{C2FEBF0B-8B24-44C6-90A3-DAC88848FC33}" dt="2024-04-26T16:37:20.746" v="1173" actId="478"/>
+            <ac:cxnSpMkLst>
+              <pc:docMk/>
+              <pc:sldMasterMk cId="2989193502" sldId="2147483884"/>
+              <pc:sldLayoutMk cId="2634379243" sldId="2147483886"/>
+              <ac:cxnSpMk id="18" creationId="{C61A0AF5-54B8-969B-D7BA-B0FA36C7D837}"/>
+            </ac:cxnSpMkLst>
+          </pc:cxnChg>
+        </pc:sldLayoutChg>
+        <pc:sldLayoutChg chg="modSp mod">
+          <pc:chgData name="Sean O Fithcheallaigh" userId="47659c31-a575-4792-8be3-61268c4ee0d6" providerId="ADAL" clId="{C2FEBF0B-8B24-44C6-90A3-DAC88848FC33}" dt="2024-04-26T16:32:27.518" v="1037" actId="255"/>
+          <pc:sldLayoutMkLst>
+            <pc:docMk/>
+            <pc:sldMasterMk cId="2989193502" sldId="2147483884"/>
+            <pc:sldLayoutMk cId="2601701279" sldId="2147483887"/>
+          </pc:sldLayoutMkLst>
+          <pc:spChg chg="mod">
+            <ac:chgData name="Sean O Fithcheallaigh" userId="47659c31-a575-4792-8be3-61268c4ee0d6" providerId="ADAL" clId="{C2FEBF0B-8B24-44C6-90A3-DAC88848FC33}" dt="2024-04-26T16:32:27.518" v="1037" actId="255"/>
+            <ac:spMkLst>
+              <pc:docMk/>
+              <pc:sldMasterMk cId="2989193502" sldId="2147483884"/>
+              <pc:sldLayoutMk cId="2601701279" sldId="2147483887"/>
+              <ac:spMk id="6" creationId="{00000000-0000-0000-0000-000000000000}"/>
+            </ac:spMkLst>
+          </pc:spChg>
+        </pc:sldLayoutChg>
+        <pc:sldLayoutChg chg="modSp mod">
+          <pc:chgData name="Sean O Fithcheallaigh" userId="47659c31-a575-4792-8be3-61268c4ee0d6" providerId="ADAL" clId="{C2FEBF0B-8B24-44C6-90A3-DAC88848FC33}" dt="2024-04-26T16:38:47.259" v="1201" actId="20577"/>
+          <pc:sldLayoutMkLst>
+            <pc:docMk/>
+            <pc:sldMasterMk cId="2989193502" sldId="2147483884"/>
+            <pc:sldLayoutMk cId="2006694186" sldId="2147483888"/>
+          </pc:sldLayoutMkLst>
+          <pc:spChg chg="mod">
+            <ac:chgData name="Sean O Fithcheallaigh" userId="47659c31-a575-4792-8be3-61268c4ee0d6" providerId="ADAL" clId="{C2FEBF0B-8B24-44C6-90A3-DAC88848FC33}" dt="2024-04-26T16:38:47.259" v="1201" actId="20577"/>
+            <ac:spMkLst>
+              <pc:docMk/>
+              <pc:sldMasterMk cId="2989193502" sldId="2147483884"/>
+              <pc:sldLayoutMk cId="2006694186" sldId="2147483888"/>
+              <ac:spMk id="7" creationId="{00000000-0000-0000-0000-000000000000}"/>
+            </ac:spMkLst>
+          </pc:spChg>
+        </pc:sldLayoutChg>
+        <pc:sldLayoutChg chg="modSp mod">
+          <pc:chgData name="Sean O Fithcheallaigh" userId="47659c31-a575-4792-8be3-61268c4ee0d6" providerId="ADAL" clId="{C2FEBF0B-8B24-44C6-90A3-DAC88848FC33}" dt="2024-04-26T16:38:56.151" v="1212" actId="20577"/>
+          <pc:sldLayoutMkLst>
+            <pc:docMk/>
+            <pc:sldMasterMk cId="2989193502" sldId="2147483884"/>
+            <pc:sldLayoutMk cId="2349671932" sldId="2147483889"/>
+          </pc:sldLayoutMkLst>
+          <pc:spChg chg="mod">
+            <ac:chgData name="Sean O Fithcheallaigh" userId="47659c31-a575-4792-8be3-61268c4ee0d6" providerId="ADAL" clId="{C2FEBF0B-8B24-44C6-90A3-DAC88848FC33}" dt="2024-04-26T16:38:56.151" v="1212" actId="20577"/>
+            <ac:spMkLst>
+              <pc:docMk/>
+              <pc:sldMasterMk cId="2989193502" sldId="2147483884"/>
+              <pc:sldLayoutMk cId="2349671932" sldId="2147483889"/>
+              <ac:spMk id="9" creationId="{00000000-0000-0000-0000-000000000000}"/>
+            </ac:spMkLst>
+          </pc:spChg>
+        </pc:sldLayoutChg>
+        <pc:sldLayoutChg chg="modSp mod">
+          <pc:chgData name="Sean O Fithcheallaigh" userId="47659c31-a575-4792-8be3-61268c4ee0d6" providerId="ADAL" clId="{C2FEBF0B-8B24-44C6-90A3-DAC88848FC33}" dt="2024-04-26T16:39:12.060" v="1230" actId="20577"/>
+          <pc:sldLayoutMkLst>
+            <pc:docMk/>
+            <pc:sldMasterMk cId="2989193502" sldId="2147483884"/>
+            <pc:sldLayoutMk cId="2885172000" sldId="2147483890"/>
+          </pc:sldLayoutMkLst>
+          <pc:spChg chg="mod">
+            <ac:chgData name="Sean O Fithcheallaigh" userId="47659c31-a575-4792-8be3-61268c4ee0d6" providerId="ADAL" clId="{C2FEBF0B-8B24-44C6-90A3-DAC88848FC33}" dt="2024-04-26T16:39:12.060" v="1230" actId="20577"/>
+            <ac:spMkLst>
+              <pc:docMk/>
+              <pc:sldMasterMk cId="2989193502" sldId="2147483884"/>
+              <pc:sldLayoutMk cId="2885172000" sldId="2147483890"/>
+              <ac:spMk id="5" creationId="{00000000-0000-0000-0000-000000000000}"/>
+            </ac:spMkLst>
+          </pc:spChg>
+        </pc:sldLayoutChg>
+        <pc:sldLayoutChg chg="modSp mod">
+          <pc:chgData name="Sean O Fithcheallaigh" userId="47659c31-a575-4792-8be3-61268c4ee0d6" providerId="ADAL" clId="{C2FEBF0B-8B24-44C6-90A3-DAC88848FC33}" dt="2024-04-26T16:39:23.958" v="1241" actId="20577"/>
+          <pc:sldLayoutMkLst>
+            <pc:docMk/>
+            <pc:sldMasterMk cId="2989193502" sldId="2147483884"/>
+            <pc:sldLayoutMk cId="873411810" sldId="2147483891"/>
+          </pc:sldLayoutMkLst>
+          <pc:spChg chg="mod">
+            <ac:chgData name="Sean O Fithcheallaigh" userId="47659c31-a575-4792-8be3-61268c4ee0d6" providerId="ADAL" clId="{C2FEBF0B-8B24-44C6-90A3-DAC88848FC33}" dt="2024-04-26T16:39:23.958" v="1241" actId="20577"/>
+            <ac:spMkLst>
+              <pc:docMk/>
+              <pc:sldMasterMk cId="2989193502" sldId="2147483884"/>
+              <pc:sldLayoutMk cId="873411810" sldId="2147483891"/>
+              <ac:spMk id="9" creationId="{00000000-0000-0000-0000-000000000000}"/>
+            </ac:spMkLst>
+          </pc:spChg>
+        </pc:sldLayoutChg>
+        <pc:sldLayoutChg chg="modSp mod">
+          <pc:chgData name="Sean O Fithcheallaigh" userId="47659c31-a575-4792-8be3-61268c4ee0d6" providerId="ADAL" clId="{C2FEBF0B-8B24-44C6-90A3-DAC88848FC33}" dt="2024-04-26T16:33:48.760" v="1114" actId="20577"/>
+          <pc:sldLayoutMkLst>
+            <pc:docMk/>
+            <pc:sldMasterMk cId="2989193502" sldId="2147483884"/>
+            <pc:sldLayoutMk cId="1387623995" sldId="2147483892"/>
+          </pc:sldLayoutMkLst>
+          <pc:spChg chg="mod">
+            <ac:chgData name="Sean O Fithcheallaigh" userId="47659c31-a575-4792-8be3-61268c4ee0d6" providerId="ADAL" clId="{C2FEBF0B-8B24-44C6-90A3-DAC88848FC33}" dt="2024-04-26T16:33:48.760" v="1114" actId="20577"/>
+            <ac:spMkLst>
+              <pc:docMk/>
+              <pc:sldMasterMk cId="2989193502" sldId="2147483884"/>
+              <pc:sldLayoutMk cId="1387623995" sldId="2147483892"/>
+              <ac:spMk id="7" creationId="{00000000-0000-0000-0000-000000000000}"/>
+            </ac:spMkLst>
+          </pc:spChg>
+        </pc:sldLayoutChg>
+        <pc:sldLayoutChg chg="modSp mod">
+          <pc:chgData name="Sean O Fithcheallaigh" userId="47659c31-a575-4792-8be3-61268c4ee0d6" providerId="ADAL" clId="{C2FEBF0B-8B24-44C6-90A3-DAC88848FC33}" dt="2024-04-26T16:34:05.010" v="1129" actId="20577"/>
+          <pc:sldLayoutMkLst>
+            <pc:docMk/>
+            <pc:sldMasterMk cId="2989193502" sldId="2147483884"/>
+            <pc:sldLayoutMk cId="4025620083" sldId="2147483893"/>
+          </pc:sldLayoutMkLst>
+          <pc:spChg chg="mod">
+            <ac:chgData name="Sean O Fithcheallaigh" userId="47659c31-a575-4792-8be3-61268c4ee0d6" providerId="ADAL" clId="{C2FEBF0B-8B24-44C6-90A3-DAC88848FC33}" dt="2024-04-26T16:34:05.010" v="1129" actId="20577"/>
+            <ac:spMkLst>
+              <pc:docMk/>
+              <pc:sldMasterMk cId="2989193502" sldId="2147483884"/>
+              <pc:sldLayoutMk cId="4025620083" sldId="2147483893"/>
+              <ac:spMk id="7" creationId="{00000000-0000-0000-0000-000000000000}"/>
+            </ac:spMkLst>
+          </pc:spChg>
+        </pc:sldLayoutChg>
+        <pc:sldLayoutChg chg="modSp mod">
+          <pc:chgData name="Sean O Fithcheallaigh" userId="47659c31-a575-4792-8be3-61268c4ee0d6" providerId="ADAL" clId="{C2FEBF0B-8B24-44C6-90A3-DAC88848FC33}" dt="2024-04-26T16:34:17.821" v="1144" actId="20577"/>
+          <pc:sldLayoutMkLst>
+            <pc:docMk/>
+            <pc:sldMasterMk cId="2989193502" sldId="2147483884"/>
+            <pc:sldLayoutMk cId="508955739" sldId="2147483894"/>
+          </pc:sldLayoutMkLst>
+          <pc:spChg chg="mod">
+            <ac:chgData name="Sean O Fithcheallaigh" userId="47659c31-a575-4792-8be3-61268c4ee0d6" providerId="ADAL" clId="{C2FEBF0B-8B24-44C6-90A3-DAC88848FC33}" dt="2024-04-26T16:34:17.821" v="1144" actId="20577"/>
+            <ac:spMkLst>
+              <pc:docMk/>
+              <pc:sldMasterMk cId="2989193502" sldId="2147483884"/>
+              <pc:sldLayoutMk cId="508955739" sldId="2147483894"/>
+              <ac:spMk id="6" creationId="{00000000-0000-0000-0000-000000000000}"/>
+            </ac:spMkLst>
+          </pc:spChg>
+        </pc:sldLayoutChg>
+        <pc:sldLayoutChg chg="modSp mod">
+          <pc:chgData name="Sean O Fithcheallaigh" userId="47659c31-a575-4792-8be3-61268c4ee0d6" providerId="ADAL" clId="{C2FEBF0B-8B24-44C6-90A3-DAC88848FC33}" dt="2024-04-26T16:34:32.510" v="1159" actId="20577"/>
+          <pc:sldLayoutMkLst>
+            <pc:docMk/>
+            <pc:sldMasterMk cId="2989193502" sldId="2147483884"/>
+            <pc:sldLayoutMk cId="4079772589" sldId="2147483895"/>
+          </pc:sldLayoutMkLst>
+          <pc:spChg chg="mod">
+            <ac:chgData name="Sean O Fithcheallaigh" userId="47659c31-a575-4792-8be3-61268c4ee0d6" providerId="ADAL" clId="{C2FEBF0B-8B24-44C6-90A3-DAC88848FC33}" dt="2024-04-26T16:34:32.510" v="1159" actId="20577"/>
+            <ac:spMkLst>
+              <pc:docMk/>
+              <pc:sldMasterMk cId="2989193502" sldId="2147483884"/>
+              <pc:sldLayoutMk cId="4079772589" sldId="2147483895"/>
+              <ac:spMk id="6" creationId="{00000000-0000-0000-0000-000000000000}"/>
+            </ac:spMkLst>
+          </pc:spChg>
+        </pc:sldLayoutChg>
+      </pc:sldMasterChg>
     </pc:docChg>
   </pc:docChgLst>
   <pc:docChgLst>
@@ -5854,7 +6445,7 @@
           <a:bodyPr/>
           <a:lstStyle/>
           <a:p>
-            <a:fld id="{A27F2E53-74FD-4822-A803-F8740BFB7820}" type="datetime1">
+            <a:fld id="{0EDB833C-2112-4A5D-94B8-048B525E1C2A}" type="datetime1">
               <a:rPr lang="en-GB" smtClean="0"/>
               <a:t>26/04/2024</a:t>
             </a:fld>
@@ -6644,7 +7235,7 @@
           <a:bodyPr/>
           <a:lstStyle/>
           <a:p>
-            <a:fld id="{922F4F2B-4496-4E96-BB72-FCD2DDED5FAC}" type="datetime1">
+            <a:fld id="{F073B5F0-505B-45C0-9DC9-45409AEBFAF7}" type="datetime1">
               <a:rPr lang="en-GB" smtClean="0"/>
               <a:t>26/04/2024</a:t>
             </a:fld>
@@ -6689,11 +7280,19 @@
           <a:bodyPr/>
           <a:lstStyle/>
           <a:p>
+            <a:r>
+              <a:rPr lang="en-GB" dirty="0"/>
+              <a:t>Slide </a:t>
+            </a:r>
             <a:fld id="{D3726DCB-FEA5-4222-BB45-1CC90DF962E6}" type="slidenum">
               <a:rPr lang="en-GB" smtClean="0"/>
+              <a:pPr/>
               <a:t>‹#›</a:t>
             </a:fld>
-            <a:endParaRPr lang="en-GB"/>
+            <a:r>
+              <a:rPr lang="en-GB" dirty="0"/>
+              <a:t> of 8</a:t>
+            </a:r>
           </a:p>
         </p:txBody>
       </p:sp>
@@ -6853,7 +7452,7 @@
           <a:bodyPr/>
           <a:lstStyle/>
           <a:p>
-            <a:fld id="{BBCA379E-BDDE-43DA-BA17-E6B54240C0B3}" type="datetime1">
+            <a:fld id="{01F1516F-DBD7-48F6-AB03-E62917ED67AF}" type="datetime1">
               <a:rPr lang="en-GB" smtClean="0"/>
               <a:t>26/04/2024</a:t>
             </a:fld>
@@ -6898,11 +7497,19 @@
           <a:bodyPr/>
           <a:lstStyle/>
           <a:p>
+            <a:r>
+              <a:rPr lang="en-GB" dirty="0"/>
+              <a:t>Slide </a:t>
+            </a:r>
             <a:fld id="{D3726DCB-FEA5-4222-BB45-1CC90DF962E6}" type="slidenum">
               <a:rPr lang="en-GB" smtClean="0"/>
+              <a:pPr/>
               <a:t>‹#›</a:t>
             </a:fld>
-            <a:endParaRPr lang="en-GB"/>
+            <a:r>
+              <a:rPr lang="en-GB" dirty="0"/>
+              <a:t> of 8</a:t>
+            </a:r>
           </a:p>
         </p:txBody>
       </p:sp>
@@ -7100,38 +7707,37 @@
           <a:p>
             <a:pPr lvl="0"/>
             <a:r>
-              <a:rPr lang="en-US"/>
+              <a:rPr lang="en-US" dirty="0"/>
               <a:t>Click to edit Master text styles</a:t>
             </a:r>
           </a:p>
           <a:p>
             <a:pPr lvl="1"/>
             <a:r>
-              <a:rPr lang="en-US"/>
+              <a:rPr lang="en-US" dirty="0"/>
               <a:t>Second level</a:t>
             </a:r>
           </a:p>
           <a:p>
             <a:pPr lvl="2"/>
             <a:r>
-              <a:rPr lang="en-US"/>
+              <a:rPr lang="en-US" dirty="0"/>
               <a:t>Third level</a:t>
             </a:r>
           </a:p>
           <a:p>
             <a:pPr lvl="3"/>
             <a:r>
-              <a:rPr lang="en-US"/>
+              <a:rPr lang="en-US" dirty="0"/>
               <a:t>Fourth level</a:t>
             </a:r>
           </a:p>
           <a:p>
             <a:pPr lvl="4"/>
             <a:r>
-              <a:rPr lang="en-US"/>
+              <a:rPr lang="en-US" dirty="0"/>
               <a:t>Fifth level</a:t>
             </a:r>
-            <a:endParaRPr lang="en-US" dirty="0"/>
           </a:p>
         </p:txBody>
       </p:sp>
@@ -7150,7 +7756,7 @@
           <a:bodyPr/>
           <a:lstStyle/>
           <a:p>
-            <a:fld id="{133DCD2D-99F9-4E1C-9F3B-8D374F39343D}" type="datetime1">
+            <a:fld id="{A7369E04-6BFB-4FA9-A0DA-B92513A014A4}" type="datetime1">
               <a:rPr lang="en-GB" smtClean="0"/>
               <a:t>26/04/2024</a:t>
             </a:fld>
@@ -7195,11 +7801,19 @@
           <a:bodyPr/>
           <a:lstStyle/>
           <a:p>
+            <a:r>
+              <a:rPr lang="en-GB" dirty="0"/>
+              <a:t>Slide </a:t>
+            </a:r>
             <a:fld id="{D3726DCB-FEA5-4222-BB45-1CC90DF962E6}" type="slidenum">
               <a:rPr lang="en-GB" smtClean="0"/>
+              <a:pPr/>
               <a:t>‹#›</a:t>
             </a:fld>
-            <a:endParaRPr lang="en-GB"/>
+            <a:r>
+              <a:rPr lang="en-GB" dirty="0"/>
+              <a:t> of 8</a:t>
+            </a:r>
           </a:p>
         </p:txBody>
       </p:sp>
@@ -7308,6 +7922,13 @@
             <a:schemeClr val="lt1"/>
           </a:fontRef>
         </p:style>
+        <p:txBody>
+          <a:bodyPr/>
+          <a:lstStyle/>
+          <a:p>
+            <a:endParaRPr lang="en-GB" dirty="0"/>
+          </a:p>
+        </p:txBody>
       </p:sp>
       <p:sp>
         <p:nvSpPr>
@@ -7478,7 +8099,7 @@
           <a:bodyPr/>
           <a:lstStyle/>
           <a:p>
-            <a:fld id="{5B07C734-A788-4C44-A615-CFDCB507568B}" type="datetime1">
+            <a:fld id="{B1507624-A8C7-451F-AA6C-F41CA746E78F}" type="datetime1">
               <a:rPr lang="en-GB" smtClean="0"/>
               <a:t>26/04/2024</a:t>
             </a:fld>
@@ -7523,11 +8144,19 @@
           <a:bodyPr/>
           <a:lstStyle/>
           <a:p>
+            <a:r>
+              <a:rPr lang="en-GB" dirty="0"/>
+              <a:t>Slide </a:t>
+            </a:r>
             <a:fld id="{D3726DCB-FEA5-4222-BB45-1CC90DF962E6}" type="slidenum">
               <a:rPr lang="en-GB" smtClean="0"/>
+              <a:pPr/>
               <a:t>‹#›</a:t>
             </a:fld>
-            <a:endParaRPr lang="en-GB"/>
+            <a:r>
+              <a:rPr lang="en-GB" dirty="0"/>
+              <a:t> of 8 </a:t>
+            </a:r>
           </a:p>
         </p:txBody>
       </p:sp>
@@ -7619,7 +8248,7 @@
 </file>
 
 <file path=ppt/slideLayouts/slideLayout3.xml><?xml version="1.0" encoding="utf-8"?>
-<p:sldLayout xmlns:a="http://schemas.openxmlformats.org/drawingml/2006/main" xmlns:r="http://schemas.openxmlformats.org/officeDocument/2006/relationships" xmlns:p="http://schemas.openxmlformats.org/presentationml/2006/main" type="obj" preserve="1">
+<p:sldLayout xmlns:a="http://schemas.openxmlformats.org/drawingml/2006/main" xmlns:r="http://schemas.openxmlformats.org/officeDocument/2006/relationships" xmlns:p="http://schemas.openxmlformats.org/presentationml/2006/main" preserve="1" userDrawn="1">
   <p:cSld name="Title and Content">
     <p:spTree>
       <p:nvGrpSpPr>
@@ -7635,34 +8264,6 @@
           <a:chExt cx="0" cy="0"/>
         </a:xfrm>
       </p:grpSpPr>
-      <p:sp>
-        <p:nvSpPr>
-          <p:cNvPr id="2" name="Title 1"/>
-          <p:cNvSpPr>
-            <a:spLocks noGrp="1"/>
-          </p:cNvSpPr>
-          <p:nvPr>
-            <p:ph type="title"/>
-          </p:nvPr>
-        </p:nvSpPr>
-        <p:spPr>
-          <a:xfrm>
-            <a:off x="1097280" y="286603"/>
-            <a:ext cx="10058400" cy="902117"/>
-          </a:xfrm>
-        </p:spPr>
-        <p:txBody>
-          <a:bodyPr/>
-          <a:lstStyle/>
-          <a:p>
-            <a:r>
-              <a:rPr lang="en-US"/>
-              <a:t>Click to edit Master title style</a:t>
-            </a:r>
-            <a:endParaRPr lang="en-US" dirty="0"/>
-          </a:p>
-        </p:txBody>
-      </p:sp>
       <p:sp>
         <p:nvSpPr>
           <p:cNvPr id="3" name="Content Placeholder 2"/>
@@ -7717,92 +8318,6 @@
               <a:t>Fifth level</a:t>
             </a:r>
             <a:endParaRPr lang="en-US" dirty="0"/>
-          </a:p>
-        </p:txBody>
-      </p:sp>
-      <p:sp>
-        <p:nvSpPr>
-          <p:cNvPr id="7" name="Date Placeholder 6">
-            <a:extLst>
-              <a:ext uri="{FF2B5EF4-FFF2-40B4-BE49-F238E27FC236}">
-                <a16:creationId xmlns:a16="http://schemas.microsoft.com/office/drawing/2014/main" id="{4B72DB9C-5DEA-6DD4-784F-41BD58908A73}"/>
-              </a:ext>
-            </a:extLst>
-          </p:cNvPr>
-          <p:cNvSpPr>
-            <a:spLocks noGrp="1"/>
-          </p:cNvSpPr>
-          <p:nvPr>
-            <p:ph type="dt" sz="half" idx="10"/>
-          </p:nvPr>
-        </p:nvSpPr>
-        <p:spPr/>
-        <p:txBody>
-          <a:bodyPr/>
-          <a:lstStyle/>
-          <a:p>
-            <a:fld id="{7778A1CA-0478-45A0-9435-D96032CA4164}" type="datetime1">
-              <a:rPr lang="en-GB" smtClean="0"/>
-              <a:t>26/04/2024</a:t>
-            </a:fld>
-            <a:endParaRPr lang="en-GB"/>
-          </a:p>
-        </p:txBody>
-      </p:sp>
-      <p:sp>
-        <p:nvSpPr>
-          <p:cNvPr id="8" name="Footer Placeholder 7">
-            <a:extLst>
-              <a:ext uri="{FF2B5EF4-FFF2-40B4-BE49-F238E27FC236}">
-                <a16:creationId xmlns:a16="http://schemas.microsoft.com/office/drawing/2014/main" id="{A289F02A-CEE2-6F05-59EC-E6ABF87D1DC6}"/>
-              </a:ext>
-            </a:extLst>
-          </p:cNvPr>
-          <p:cNvSpPr>
-            <a:spLocks noGrp="1"/>
-          </p:cNvSpPr>
-          <p:nvPr>
-            <p:ph type="ftr" sz="quarter" idx="11"/>
-          </p:nvPr>
-        </p:nvSpPr>
-        <p:spPr/>
-        <p:txBody>
-          <a:bodyPr/>
-          <a:lstStyle/>
-          <a:p>
-            <a:r>
-              <a:rPr lang="en-GB"/>
-              <a:t>Supervisor Meeting</a:t>
-            </a:r>
-          </a:p>
-        </p:txBody>
-      </p:sp>
-      <p:sp>
-        <p:nvSpPr>
-          <p:cNvPr id="9" name="Slide Number Placeholder 8">
-            <a:extLst>
-              <a:ext uri="{FF2B5EF4-FFF2-40B4-BE49-F238E27FC236}">
-                <a16:creationId xmlns:a16="http://schemas.microsoft.com/office/drawing/2014/main" id="{AF8782C5-747C-DD09-7234-882A1D5FD405}"/>
-              </a:ext>
-            </a:extLst>
-          </p:cNvPr>
-          <p:cNvSpPr>
-            <a:spLocks noGrp="1"/>
-          </p:cNvSpPr>
-          <p:nvPr>
-            <p:ph type="sldNum" sz="quarter" idx="12"/>
-          </p:nvPr>
-        </p:nvSpPr>
-        <p:spPr/>
-        <p:txBody>
-          <a:bodyPr/>
-          <a:lstStyle/>
-          <a:p>
-            <a:fld id="{D3726DCB-FEA5-4222-BB45-1CC90DF962E6}" type="slidenum">
-              <a:rPr lang="en-GB" smtClean="0"/>
-              <a:t>‹#›</a:t>
-            </a:fld>
-            <a:endParaRPr lang="en-GB"/>
           </a:p>
         </p:txBody>
       </p:sp>
@@ -7842,6 +8357,122 @@
           </a:prstGeom>
         </p:spPr>
       </p:pic>
+      <p:sp>
+        <p:nvSpPr>
+          <p:cNvPr id="4" name="Date Placeholder 3">
+            <a:extLst>
+              <a:ext uri="{FF2B5EF4-FFF2-40B4-BE49-F238E27FC236}">
+                <a16:creationId xmlns:a16="http://schemas.microsoft.com/office/drawing/2014/main" id="{32CA3BB0-ABD2-570B-583C-1071A2380DC3}"/>
+              </a:ext>
+            </a:extLst>
+          </p:cNvPr>
+          <p:cNvSpPr>
+            <a:spLocks noGrp="1"/>
+          </p:cNvSpPr>
+          <p:nvPr>
+            <p:ph type="dt" sz="half" idx="10"/>
+          </p:nvPr>
+        </p:nvSpPr>
+        <p:spPr/>
+        <p:txBody>
+          <a:bodyPr/>
+          <a:lstStyle/>
+          <a:p>
+            <a:fld id="{88E9D55D-69DC-4D39-A7A9-6A2CB0A4A7C3}" type="datetime1">
+              <a:rPr lang="en-GB" smtClean="0"/>
+              <a:t>26/04/2024</a:t>
+            </a:fld>
+            <a:endParaRPr lang="en-GB"/>
+          </a:p>
+        </p:txBody>
+      </p:sp>
+      <p:sp>
+        <p:nvSpPr>
+          <p:cNvPr id="5" name="Footer Placeholder 4">
+            <a:extLst>
+              <a:ext uri="{FF2B5EF4-FFF2-40B4-BE49-F238E27FC236}">
+                <a16:creationId xmlns:a16="http://schemas.microsoft.com/office/drawing/2014/main" id="{D82E76A2-E7F3-53D9-FE64-5134EEA0E34D}"/>
+              </a:ext>
+            </a:extLst>
+          </p:cNvPr>
+          <p:cNvSpPr>
+            <a:spLocks noGrp="1"/>
+          </p:cNvSpPr>
+          <p:nvPr>
+            <p:ph type="ftr" sz="quarter" idx="11"/>
+          </p:nvPr>
+        </p:nvSpPr>
+        <p:spPr/>
+        <p:txBody>
+          <a:bodyPr/>
+          <a:lstStyle/>
+          <a:p>
+            <a:r>
+              <a:rPr lang="en-GB"/>
+              <a:t>Supervisor Meeting</a:t>
+            </a:r>
+          </a:p>
+        </p:txBody>
+      </p:sp>
+      <p:sp>
+        <p:nvSpPr>
+          <p:cNvPr id="10" name="Slide Number Placeholder 9">
+            <a:extLst>
+              <a:ext uri="{FF2B5EF4-FFF2-40B4-BE49-F238E27FC236}">
+                <a16:creationId xmlns:a16="http://schemas.microsoft.com/office/drawing/2014/main" id="{2EE445F7-B179-E8DE-D480-8DF57793A679}"/>
+              </a:ext>
+            </a:extLst>
+          </p:cNvPr>
+          <p:cNvSpPr>
+            <a:spLocks noGrp="1"/>
+          </p:cNvSpPr>
+          <p:nvPr>
+            <p:ph type="sldNum" sz="quarter" idx="12"/>
+          </p:nvPr>
+        </p:nvSpPr>
+        <p:spPr/>
+        <p:txBody>
+          <a:bodyPr/>
+          <a:lstStyle/>
+          <a:p>
+            <a:fld id="{D3726DCB-FEA5-4222-BB45-1CC90DF962E6}" type="slidenum">
+              <a:rPr lang="en-GB" smtClean="0"/>
+              <a:pPr/>
+              <a:t>‹#›</a:t>
+            </a:fld>
+            <a:endParaRPr lang="en-GB" dirty="0"/>
+          </a:p>
+        </p:txBody>
+      </p:sp>
+      <p:sp>
+        <p:nvSpPr>
+          <p:cNvPr id="11" name="Title 10">
+            <a:extLst>
+              <a:ext uri="{FF2B5EF4-FFF2-40B4-BE49-F238E27FC236}">
+                <a16:creationId xmlns:a16="http://schemas.microsoft.com/office/drawing/2014/main" id="{89FC3449-D20D-A55B-145B-B78CC5FFD454}"/>
+              </a:ext>
+            </a:extLst>
+          </p:cNvPr>
+          <p:cNvSpPr>
+            <a:spLocks noGrp="1"/>
+          </p:cNvSpPr>
+          <p:nvPr>
+            <p:ph type="title"/>
+          </p:nvPr>
+        </p:nvSpPr>
+        <p:spPr/>
+        <p:txBody>
+          <a:bodyPr/>
+          <a:lstStyle/>
+          <a:p>
+            <a:r>
+              <a:rPr lang="en-US"/>
+              <a:t>Click to edit Master title style</a:t>
+            </a:r>
+            <a:endParaRPr lang="en-GB"/>
+          </a:p>
+        </p:txBody>
+      </p:sp>
     </p:spTree>
     <p:extLst>
       <p:ext uri="{BB962C8B-B14F-4D97-AF65-F5344CB8AC3E}">
@@ -8129,7 +8760,7 @@
           <a:bodyPr/>
           <a:lstStyle/>
           <a:p>
-            <a:fld id="{23DC5470-1C1D-4923-B8A8-961DFF721FBD}" type="datetime1">
+            <a:fld id="{C64B38AD-2F15-4BE5-AD80-B895FB89AFCA}" type="datetime1">
               <a:rPr lang="en-GB" smtClean="0"/>
               <a:t>26/04/2024</a:t>
             </a:fld>
@@ -8153,7 +8784,7 @@
           <a:lstStyle/>
           <a:p>
             <a:r>
-              <a:rPr lang="en-GB"/>
+              <a:rPr lang="en-GB" dirty="0"/>
               <a:t>Supervisor Meeting</a:t>
             </a:r>
           </a:p>
@@ -8172,13 +8803,16 @@
         <p:spPr/>
         <p:txBody>
           <a:bodyPr/>
-          <a:lstStyle/>
-          <a:p>
-            <a:fld id="{D3726DCB-FEA5-4222-BB45-1CC90DF962E6}" type="slidenum">
-              <a:rPr lang="en-GB" smtClean="0"/>
-              <a:t>‹#›</a:t>
-            </a:fld>
-            <a:endParaRPr lang="en-GB"/>
+          <a:lstStyle>
+            <a:lvl1pPr>
+              <a:defRPr sz="900"/>
+            </a:lvl1pPr>
+          </a:lstStyle>
+          <a:p>
+            <a:r>
+              <a:rPr lang="en-GB" dirty="0"/>
+              <a:t>Slide  &lt;#&gt; of 8</a:t>
+            </a:r>
           </a:p>
         </p:txBody>
       </p:sp>
@@ -8443,7 +9077,7 @@
           <a:bodyPr/>
           <a:lstStyle/>
           <a:p>
-            <a:fld id="{0E741BE0-2C8A-4B1C-AFBF-7305842CD248}" type="datetime1">
+            <a:fld id="{D954CD11-AB0F-4C31-B0E2-70479CDD90CA}" type="datetime1">
               <a:rPr lang="en-GB" smtClean="0"/>
               <a:t>26/04/2024</a:t>
             </a:fld>
@@ -8490,9 +9124,10 @@
           <a:p>
             <a:fld id="{D3726DCB-FEA5-4222-BB45-1CC90DF962E6}" type="slidenum">
               <a:rPr lang="en-GB" smtClean="0"/>
+              <a:pPr/>
               <a:t>‹#›</a:t>
             </a:fld>
-            <a:endParaRPr lang="en-GB"/>
+            <a:endParaRPr lang="en-GB" dirty="0"/>
           </a:p>
         </p:txBody>
       </p:sp>
@@ -8861,7 +9496,7 @@
           <a:bodyPr/>
           <a:lstStyle/>
           <a:p>
-            <a:fld id="{3D2519A9-BEC6-4C36-B98F-DA784E00FBFE}" type="datetime1">
+            <a:fld id="{39724E80-1C91-49FB-8C33-C44EBFE375F3}" type="datetime1">
               <a:rPr lang="en-GB" smtClean="0"/>
               <a:t>26/04/2024</a:t>
             </a:fld>
@@ -8908,9 +9543,10 @@
           <a:p>
             <a:fld id="{D3726DCB-FEA5-4222-BB45-1CC90DF962E6}" type="slidenum">
               <a:rPr lang="en-GB" smtClean="0"/>
+              <a:pPr/>
               <a:t>‹#›</a:t>
             </a:fld>
-            <a:endParaRPr lang="en-GB"/>
+            <a:endParaRPr lang="en-GB" dirty="0"/>
           </a:p>
         </p:txBody>
       </p:sp>
@@ -9018,7 +9654,7 @@
           <a:bodyPr/>
           <a:lstStyle/>
           <a:p>
-            <a:fld id="{005527DF-4A67-459D-BBB9-9CF200764E01}" type="datetime1">
+            <a:fld id="{E3160652-0335-4D10-866B-80725FB2DD73}" type="datetime1">
               <a:rPr lang="en-GB" smtClean="0"/>
               <a:t>26/04/2024</a:t>
             </a:fld>
@@ -9065,9 +9701,10 @@
           <a:p>
             <a:fld id="{D3726DCB-FEA5-4222-BB45-1CC90DF962E6}" type="slidenum">
               <a:rPr lang="en-GB" smtClean="0"/>
+              <a:pPr/>
               <a:t>‹#›</a:t>
             </a:fld>
-            <a:endParaRPr lang="en-GB"/>
+            <a:endParaRPr lang="en-GB" dirty="0"/>
           </a:p>
         </p:txBody>
       </p:sp>
@@ -9230,7 +9867,7 @@
           <a:bodyPr/>
           <a:lstStyle/>
           <a:p>
-            <a:fld id="{AB815DF0-B384-4B57-B949-BD773032C594}" type="datetime1">
+            <a:fld id="{97DE37E0-BCE1-4503-A874-44663480E668}" type="datetime1">
               <a:rPr lang="en-GB" smtClean="0"/>
               <a:t>26/04/2024</a:t>
             </a:fld>
@@ -9285,9 +9922,10 @@
           <a:p>
             <a:fld id="{D3726DCB-FEA5-4222-BB45-1CC90DF962E6}" type="slidenum">
               <a:rPr lang="en-GB" smtClean="0"/>
+              <a:pPr/>
               <a:t>‹#›</a:t>
             </a:fld>
-            <a:endParaRPr lang="en-GB"/>
+            <a:endParaRPr lang="en-GB" dirty="0"/>
           </a:p>
         </p:txBody>
       </p:sp>
@@ -9625,7 +10263,7 @@
             </a:lvl1pPr>
           </a:lstStyle>
           <a:p>
-            <a:fld id="{9A7FC2E2-2BAF-4FF7-AB60-CB61E8F4481E}" type="datetime1">
+            <a:fld id="{F8569651-7BFA-471C-92F8-6D7128DF53DE}" type="datetime1">
               <a:rPr lang="en-GB" smtClean="0"/>
               <a:t>26/04/2024</a:t>
             </a:fld>
@@ -9691,11 +10329,19 @@
             </a:lvl1pPr>
           </a:lstStyle>
           <a:p>
+            <a:r>
+              <a:rPr lang="en-GB" dirty="0"/>
+              <a:t>Slide </a:t>
+            </a:r>
             <a:fld id="{D3726DCB-FEA5-4222-BB45-1CC90DF962E6}" type="slidenum">
               <a:rPr lang="en-GB" smtClean="0"/>
+              <a:pPr/>
               <a:t>‹#›</a:t>
             </a:fld>
-            <a:endParaRPr lang="en-GB"/>
+            <a:r>
+              <a:rPr lang="en-GB" dirty="0"/>
+              <a:t> of 8</a:t>
+            </a:r>
           </a:p>
         </p:txBody>
       </p:sp>
@@ -9977,7 +10623,7 @@
             </a:lvl1pPr>
           </a:lstStyle>
           <a:p>
-            <a:fld id="{A27F2E53-74FD-4822-A803-F8740BFB7820}" type="datetime1">
+            <a:fld id="{8EC4C998-08B5-46FE-92E2-BDC46698AC12}" type="datetime1">
               <a:rPr lang="en-GB" smtClean="0"/>
               <a:t>26/04/2024</a:t>
             </a:fld>
@@ -10510,35 +11156,6 @@
       </p:grpSpPr>
       <p:sp>
         <p:nvSpPr>
-          <p:cNvPr id="4" name="Slide Number Placeholder 3">
-            <a:extLst>
-              <a:ext uri="{FF2B5EF4-FFF2-40B4-BE49-F238E27FC236}">
-                <a16:creationId xmlns:a16="http://schemas.microsoft.com/office/drawing/2014/main" id="{6E59C339-3FE2-29B0-F8A2-A5B7F1FC960A}"/>
-              </a:ext>
-            </a:extLst>
-          </p:cNvPr>
-          <p:cNvSpPr>
-            <a:spLocks noGrp="1"/>
-          </p:cNvSpPr>
-          <p:nvPr>
-            <p:ph type="sldNum" sz="quarter" idx="12"/>
-          </p:nvPr>
-        </p:nvSpPr>
-        <p:spPr/>
-        <p:txBody>
-          <a:bodyPr/>
-          <a:lstStyle/>
-          <a:p>
-            <a:fld id="{D3726DCB-FEA5-4222-BB45-1CC90DF962E6}" type="slidenum">
-              <a:rPr lang="en-GB" smtClean="0"/>
-              <a:t>1</a:t>
-            </a:fld>
-            <a:endParaRPr lang="en-GB"/>
-          </a:p>
-        </p:txBody>
-      </p:sp>
-      <p:sp>
-        <p:nvSpPr>
           <p:cNvPr id="6" name="Subtitle 5">
             <a:extLst>
               <a:ext uri="{FF2B5EF4-FFF2-40B4-BE49-F238E27FC236}">
@@ -10850,7 +11467,12 @@
             <p:ph type="sldNum" sz="quarter" idx="12"/>
           </p:nvPr>
         </p:nvSpPr>
-        <p:spPr/>
+        <p:spPr>
+          <a:xfrm>
+            <a:off x="9900458" y="6459785"/>
+            <a:ext cx="1312025" cy="365125"/>
+          </a:xfrm>
+        </p:spPr>
         <p:txBody>
           <a:bodyPr/>
           <a:lstStyle/>
@@ -11127,7 +11749,12 @@
             <p:ph type="sldNum" sz="quarter" idx="12"/>
           </p:nvPr>
         </p:nvSpPr>
-        <p:spPr/>
+        <p:spPr>
+          <a:xfrm>
+            <a:off x="9900458" y="6459785"/>
+            <a:ext cx="1312025" cy="365125"/>
+          </a:xfrm>
+        </p:spPr>
         <p:txBody>
           <a:bodyPr/>
           <a:lstStyle/>
@@ -11669,7 +12296,12 @@
             <p:ph type="sldNum" sz="quarter" idx="12"/>
           </p:nvPr>
         </p:nvSpPr>
-        <p:spPr/>
+        <p:spPr>
+          <a:xfrm>
+            <a:off x="9900458" y="6459785"/>
+            <a:ext cx="1312025" cy="365125"/>
+          </a:xfrm>
+        </p:spPr>
         <p:txBody>
           <a:bodyPr/>
           <a:lstStyle/>
@@ -12135,7 +12767,12 @@
             <p:ph type="title"/>
           </p:nvPr>
         </p:nvSpPr>
-        <p:spPr/>
+        <p:spPr>
+          <a:xfrm>
+            <a:off x="1097280" y="286603"/>
+            <a:ext cx="10058400" cy="902117"/>
+          </a:xfrm>
+        </p:spPr>
         <p:txBody>
           <a:bodyPr/>
           <a:lstStyle/>
@@ -12171,32 +12808,47 @@
           </a:xfrm>
         </p:spPr>
         <p:txBody>
-          <a:bodyPr/>
+          <a:bodyPr>
+            <a:normAutofit/>
+          </a:bodyPr>
           <a:lstStyle/>
           <a:p>
-            <a:pPr>
-              <a:buFont typeface="Arial" panose="020B0604020202020204" pitchFamily="34" charset="0"/>
-              <a:buChar char="•"/>
+            <a:pPr marL="0" indent="0">
+              <a:buNone/>
             </a:pPr>
             <a:r>
               <a:rPr lang="en-US" dirty="0"/>
-              <a:t>The challenges identified seem like they could be related, and as such could be grouped together. </a:t>
-            </a:r>
-          </a:p>
-          <a:p>
-            <a:pPr>
-              <a:buFont typeface="Arial" panose="020B0604020202020204" pitchFamily="34" charset="0"/>
-              <a:buChar char="•"/>
+              <a:t>The challenges identified seem like they </a:t>
+            </a:r>
+            <a:r>
+              <a:rPr lang="en-US" b="1" dirty="0"/>
+              <a:t>could be related</a:t>
+            </a:r>
+            <a:r>
+              <a:rPr lang="en-US" dirty="0"/>
+              <a:t>, and as such could be grouped together. </a:t>
+            </a:r>
+          </a:p>
+          <a:p>
+            <a:pPr marL="0" indent="0">
+              <a:buNone/>
             </a:pPr>
             <a:r>
               <a:rPr lang="en-US" dirty="0"/>
-              <a:t>These groups should not be viewed as totally independent, for example, model heterogeneity and system heterogeneity are related through the idea that different clients could run different model, and so on</a:t>
-            </a:r>
-          </a:p>
-          <a:p>
-            <a:pPr>
-              <a:buFont typeface="Arial" panose="020B0604020202020204" pitchFamily="34" charset="0"/>
-              <a:buChar char="•"/>
+              <a:t>These groups should </a:t>
+            </a:r>
+            <a:r>
+              <a:rPr lang="en-US" b="1" dirty="0"/>
+              <a:t>not be viewed as totally independent</a:t>
+            </a:r>
+            <a:r>
+              <a:rPr lang="en-US" dirty="0"/>
+              <a:t>, for example, model heterogeneity and system heterogeneity are related through the idea that different clients could run different model, and so on</a:t>
+            </a:r>
+          </a:p>
+          <a:p>
+            <a:pPr marL="0" indent="0">
+              <a:buNone/>
             </a:pPr>
             <a:r>
               <a:rPr lang="en-US" dirty="0"/>
@@ -12221,7 +12873,12 @@
             <p:ph type="sldNum" sz="quarter" idx="12"/>
           </p:nvPr>
         </p:nvSpPr>
-        <p:spPr/>
+        <p:spPr>
+          <a:xfrm>
+            <a:off x="9900458" y="6459785"/>
+            <a:ext cx="1312025" cy="365125"/>
+          </a:xfrm>
+        </p:spPr>
         <p:txBody>
           <a:bodyPr/>
           <a:lstStyle/>
@@ -12264,36 +12921,6 @@
           <a:chExt cx="0" cy="0"/>
         </a:xfrm>
       </p:grpSpPr>
-      <p:pic>
-        <p:nvPicPr>
-          <p:cNvPr id="16" name="Picture 15">
-            <a:extLst>
-              <a:ext uri="{FF2B5EF4-FFF2-40B4-BE49-F238E27FC236}">
-                <a16:creationId xmlns:a16="http://schemas.microsoft.com/office/drawing/2014/main" id="{9DF56113-8FB4-E099-8726-3F16F626D2FE}"/>
-              </a:ext>
-            </a:extLst>
-          </p:cNvPr>
-          <p:cNvPicPr>
-            <a:picLocks noChangeAspect="1"/>
-          </p:cNvPicPr>
-          <p:nvPr/>
-        </p:nvPicPr>
-        <p:blipFill>
-          <a:blip r:embed="rId2"/>
-          <a:stretch>
-            <a:fillRect/>
-          </a:stretch>
-        </p:blipFill>
-        <p:spPr>
-          <a:xfrm>
-            <a:off x="6035038" y="1975111"/>
-            <a:ext cx="2400508" cy="1882303"/>
-          </a:xfrm>
-          <a:prstGeom prst="rect">
-            <a:avLst/>
-          </a:prstGeom>
-        </p:spPr>
-      </p:pic>
       <p:sp>
         <p:nvSpPr>
           <p:cNvPr id="2" name="Title 1">
@@ -12344,7 +12971,12 @@
             <p:ph sz="half" idx="1"/>
           </p:nvPr>
         </p:nvSpPr>
-        <p:spPr/>
+        <p:spPr>
+          <a:xfrm>
+            <a:off x="1097278" y="1559946"/>
+            <a:ext cx="4937760" cy="4309148"/>
+          </a:xfrm>
+        </p:spPr>
         <p:txBody>
           <a:bodyPr/>
           <a:lstStyle/>
@@ -12401,7 +13033,7 @@
         </p:nvSpPr>
         <p:spPr>
           <a:xfrm>
-            <a:off x="1188720" y="1568824"/>
+            <a:off x="1097278" y="1559946"/>
             <a:ext cx="4937760" cy="4382443"/>
           </a:xfrm>
           <a:prstGeom prst="rect">
@@ -12674,7 +13306,19 @@
             </a:pPr>
             <a:r>
               <a:rPr lang="en-US" dirty="0"/>
-              <a:t>Provides understanding of TensorFlow and PyTorch</a:t>
+              <a:t>Provides understanding of </a:t>
+            </a:r>
+            <a:r>
+              <a:rPr lang="en-US" b="1" dirty="0"/>
+              <a:t>TensorFlow</a:t>
+            </a:r>
+            <a:r>
+              <a:rPr lang="en-US" dirty="0"/>
+              <a:t> and </a:t>
+            </a:r>
+            <a:r>
+              <a:rPr lang="en-US" b="1" dirty="0"/>
+              <a:t>PyTorch</a:t>
             </a:r>
           </a:p>
           <a:p>
@@ -12694,7 +13338,11 @@
             </a:pPr>
             <a:r>
               <a:rPr lang="en-US" dirty="0"/>
-              <a:t>Provides a range of datasets for FL work</a:t>
+              <a:t>Provides a range of </a:t>
+            </a:r>
+            <a:r>
+              <a:rPr lang="en-US" b="1" dirty="0"/>
+              <a:t>datasets for FL work</a:t>
             </a:r>
           </a:p>
           <a:p>
@@ -12725,48 +13373,19 @@
           <p:nvPr/>
         </p:nvPicPr>
         <p:blipFill>
-          <a:blip r:embed="rId3"/>
+          <a:blip r:embed="rId2"/>
           <a:stretch>
             <a:fillRect/>
           </a:stretch>
         </p:blipFill>
         <p:spPr>
           <a:xfrm>
-            <a:off x="1422753" y="4405843"/>
-            <a:ext cx="2143405" cy="1109255"/>
+            <a:off x="1928780" y="4285240"/>
+            <a:ext cx="3060470" cy="1583854"/>
           </a:xfrm>
           <a:prstGeom prst="rect">
             <a:avLst/>
           </a:prstGeom>
-        </p:spPr>
-      </p:pic>
-      <p:pic>
-        <p:nvPicPr>
-          <p:cNvPr id="14" name="Content Placeholder 13">
-            <a:extLst>
-              <a:ext uri="{FF2B5EF4-FFF2-40B4-BE49-F238E27FC236}">
-                <a16:creationId xmlns:a16="http://schemas.microsoft.com/office/drawing/2014/main" id="{0D671002-A1C1-5991-19D7-14273487CF59}"/>
-              </a:ext>
-            </a:extLst>
-          </p:cNvPr>
-          <p:cNvPicPr>
-            <a:picLocks noGrp="1" noChangeAspect="1"/>
-          </p:cNvPicPr>
-          <p:nvPr>
-            <p:ph sz="half" idx="2"/>
-          </p:nvPr>
-        </p:nvPicPr>
-        <p:blipFill>
-          <a:blip r:embed="rId4"/>
-          <a:stretch>
-            <a:fillRect/>
-          </a:stretch>
-        </p:blipFill>
-        <p:spPr>
-          <a:xfrm>
-            <a:off x="7161030" y="2386626"/>
-            <a:ext cx="4900085" cy="2941575"/>
-          </a:xfrm>
         </p:spPr>
       </p:pic>
       <p:pic>
@@ -12784,14 +13403,14 @@
           <p:nvPr/>
         </p:nvPicPr>
         <p:blipFill>
-          <a:blip r:embed="rId5"/>
+          <a:blip r:embed="rId3"/>
           <a:stretch>
             <a:fillRect/>
           </a:stretch>
         </p:blipFill>
         <p:spPr>
           <a:xfrm>
-            <a:off x="3800191" y="4343196"/>
+            <a:off x="9900458" y="4634547"/>
             <a:ext cx="2080440" cy="1234547"/>
           </a:xfrm>
           <a:prstGeom prst="rect">
@@ -12799,53 +13418,36 @@
           </a:prstGeom>
         </p:spPr>
       </p:pic>
-      <p:sp>
-        <p:nvSpPr>
-          <p:cNvPr id="17" name="Rectangle 16">
+      <p:pic>
+        <p:nvPicPr>
+          <p:cNvPr id="10" name="Picture 9">
             <a:extLst>
               <a:ext uri="{FF2B5EF4-FFF2-40B4-BE49-F238E27FC236}">
-                <a16:creationId xmlns:a16="http://schemas.microsoft.com/office/drawing/2014/main" id="{C31A4E13-5F28-94ED-4FD6-DC5893FB7BD9}"/>
+                <a16:creationId xmlns:a16="http://schemas.microsoft.com/office/drawing/2014/main" id="{98AF2C53-745E-2EFD-CD0C-23788E4785BE}"/>
               </a:ext>
             </a:extLst>
           </p:cNvPr>
-          <p:cNvSpPr/>
+          <p:cNvPicPr>
+            <a:picLocks noChangeAspect="1"/>
+          </p:cNvPicPr>
           <p:nvPr/>
-        </p:nvSpPr>
+        </p:nvPicPr>
+        <p:blipFill>
+          <a:blip r:embed="rId4"/>
+          <a:stretch>
+            <a:fillRect/>
+          </a:stretch>
+        </p:blipFill>
         <p:spPr>
           <a:xfrm>
-            <a:off x="6156964" y="3648635"/>
-            <a:ext cx="835507" cy="259977"/>
+            <a:off x="6106359" y="1489128"/>
+            <a:ext cx="6003478" cy="3047306"/>
           </a:xfrm>
           <a:prstGeom prst="rect">
             <a:avLst/>
           </a:prstGeom>
-          <a:noFill/>
         </p:spPr>
-        <p:style>
-          <a:lnRef idx="2">
-            <a:schemeClr val="accent2">
-              <a:shade val="50000"/>
-            </a:schemeClr>
-          </a:lnRef>
-          <a:fillRef idx="1">
-            <a:schemeClr val="accent2"/>
-          </a:fillRef>
-          <a:effectRef idx="0">
-            <a:schemeClr val="accent2"/>
-          </a:effectRef>
-          <a:fontRef idx="minor">
-            <a:schemeClr val="lt1"/>
-          </a:fontRef>
-        </p:style>
-        <p:txBody>
-          <a:bodyPr rtlCol="0" anchor="ctr"/>
-          <a:lstStyle/>
-          <a:p>
-            <a:pPr algn="ctr"/>
-            <a:endParaRPr lang="en-GB"/>
-          </a:p>
-        </p:txBody>
-      </p:sp>
+      </p:pic>
     </p:spTree>
     <p:extLst>
       <p:ext uri="{BB962C8B-B14F-4D97-AF65-F5344CB8AC3E}">
@@ -13017,7 +13619,7 @@
           <a:p>
             <a:r>
               <a:rPr lang="en-US" dirty="0"/>
-              <a:t>Development of a TinyFL project using Arduino Nano 33 BLE microcontrollers to simulate detecting network intrusions. </a:t>
+              <a:t>Development of a TinyFL project used to simulate detecting network intrusions. </a:t>
             </a:r>
           </a:p>
           <a:p>
@@ -13027,7 +13629,23 @@
             </a:pPr>
             <a:r>
               <a:rPr lang="en-US" dirty="0"/>
-              <a:t>The system would have several dev kits acting as clients and a laptop or Raspberry Pi as a server</a:t>
+              <a:t>The system would have several </a:t>
+            </a:r>
+            <a:r>
+              <a:rPr lang="en-US" b="1" dirty="0"/>
+              <a:t>Arduino Nano </a:t>
+            </a:r>
+            <a:r>
+              <a:rPr lang="en-US" dirty="0"/>
+              <a:t>dev kits acting as clients and a laptop or </a:t>
+            </a:r>
+            <a:r>
+              <a:rPr lang="en-US" b="1" dirty="0"/>
+              <a:t>Raspberry Pi </a:t>
+            </a:r>
+            <a:r>
+              <a:rPr lang="en-US" dirty="0"/>
+              <a:t>as a server</a:t>
             </a:r>
           </a:p>
           <a:p>
@@ -13047,7 +13665,11 @@
             </a:pPr>
             <a:r>
               <a:rPr lang="en-US" dirty="0"/>
-              <a:t>External button push on Client 1 representing Intrusion Type 1</a:t>
+              <a:t>External button push on </a:t>
+            </a:r>
+            <a:r>
+              <a:rPr lang="en-US" b="1" dirty="0"/>
+              <a:t>Client 1 representing Intrusion Type 1</a:t>
             </a:r>
           </a:p>
           <a:p>
@@ -13057,7 +13679,11 @@
             </a:pPr>
             <a:r>
               <a:rPr lang="en-US" dirty="0"/>
-              <a:t>Accelerometer threshold in x-axis exceeded on Client 2 representing Intrusion Type 2</a:t>
+              <a:t>Accelerometer threshold in x-axis exceeded on </a:t>
+            </a:r>
+            <a:r>
+              <a:rPr lang="en-US" b="1" dirty="0"/>
+              <a:t>Client 2 representing Intrusion Type 2</a:t>
             </a:r>
           </a:p>
           <a:p>
@@ -13067,7 +13693,11 @@
             </a:pPr>
             <a:r>
               <a:rPr lang="en-US" dirty="0"/>
-              <a:t>Accelerometer threshold  in y-axis on Client 3 exceeded for intrusion type 3</a:t>
+              <a:t>Accelerometer threshold  in y-axis exceeded on </a:t>
+            </a:r>
+            <a:r>
+              <a:rPr lang="en-US" b="1" dirty="0"/>
+              <a:t>Client 3 represents Intrusion Type 3</a:t>
             </a:r>
           </a:p>
           <a:p>
@@ -13146,7 +13776,7 @@
         </p:blipFill>
         <p:spPr>
           <a:xfrm>
-            <a:off x="6268154" y="3898182"/>
+            <a:off x="6183364" y="4599404"/>
             <a:ext cx="1925551" cy="1619823"/>
           </a:xfrm>
           <a:prstGeom prst="rect">
@@ -13200,7 +13830,12 @@
             <p:ph type="title"/>
           </p:nvPr>
         </p:nvSpPr>
-        <p:spPr/>
+        <p:spPr>
+          <a:xfrm>
+            <a:off x="1097280" y="286603"/>
+            <a:ext cx="10058400" cy="902117"/>
+          </a:xfrm>
+        </p:spPr>
         <p:txBody>
           <a:bodyPr/>
           <a:lstStyle/>
@@ -13249,10 +13884,9 @@
               <a:buChar char="•"/>
             </a:pPr>
             <a:r>
-              <a:rPr lang="en-US"/>
+              <a:rPr lang="en-US" dirty="0"/>
               <a:t>Completing tutorials</a:t>
             </a:r>
-            <a:endParaRPr lang="en-US" dirty="0"/>
           </a:p>
           <a:p>
             <a:pPr>
@@ -13352,7 +13986,12 @@
             <p:ph type="sldNum" sz="quarter" idx="12"/>
           </p:nvPr>
         </p:nvSpPr>
-        <p:spPr/>
+        <p:spPr>
+          <a:xfrm>
+            <a:off x="9900458" y="6459785"/>
+            <a:ext cx="1312025" cy="365125"/>
+          </a:xfrm>
+        </p:spPr>
         <p:txBody>
           <a:bodyPr/>
           <a:lstStyle/>

</xml_diff>